<commit_message>
releasing preliminary version of Module 09
</commit_message>
<xml_diff>
--- a/Slides/Lesson 9.1 Classes, Objects, and Methods.pptx
+++ b/Slides/Lesson 9.1 Classes, Objects, and Methods.pptx
@@ -235,7 +235,7 @@
           <a:p>
             <a:fld id="{36D53524-F9CC-4A8B-8CCD-2FA372311425}" type="datetimeFigureOut">
               <a:rPr lang="en-US" smtClean="0"/>
-              <a:t>10/31/2015</a:t>
+              <a:t>11/3/2015</a:t>
             </a:fld>
             <a:endParaRPr lang="en-US"/>
           </a:p>
@@ -1524,7 +1524,7 @@
           <a:p>
             <a:fld id="{2F1F79F5-7BEC-496A-AFC7-876E38F64D71}" type="datetime1">
               <a:rPr lang="en-US" smtClean="0"/>
-              <a:t>10/31/2015</a:t>
+              <a:t>11/3/2015</a:t>
             </a:fld>
             <a:endParaRPr lang="en-US"/>
           </a:p>
@@ -1649,7 +1649,7 @@
           <a:p>
             <a:fld id="{2F7B77F5-1464-4F6B-92A8-64FC8A508293}" type="datetime1">
               <a:rPr lang="en-US" smtClean="0"/>
-              <a:t>10/31/2015</a:t>
+              <a:t>11/3/2015</a:t>
             </a:fld>
             <a:endParaRPr lang="en-US"/>
           </a:p>
@@ -1751,7 +1751,7 @@
           <a:p>
             <a:fld id="{0A05703A-7669-4FEA-9056-25299B4D29D4}" type="datetime1">
               <a:rPr lang="en-US" smtClean="0"/>
-              <a:t>10/31/2015</a:t>
+              <a:t>11/3/2015</a:t>
             </a:fld>
             <a:endParaRPr lang="en-US"/>
           </a:p>
@@ -2028,7 +2028,7 @@
           <a:p>
             <a:fld id="{6E5077B5-BB57-49DB-88CA-226A139E5C01}" type="datetime1">
               <a:rPr lang="en-US" smtClean="0"/>
-              <a:t>10/31/2015</a:t>
+              <a:t>11/3/2015</a:t>
             </a:fld>
             <a:endParaRPr lang="en-US"/>
           </a:p>
@@ -2281,7 +2281,7 @@
           <a:p>
             <a:fld id="{C48D9447-CBD6-49A1-89FD-8512A8CF8999}" type="datetime1">
               <a:rPr lang="en-US" smtClean="0"/>
-              <a:t>10/31/2015</a:t>
+              <a:t>11/3/2015</a:t>
             </a:fld>
             <a:endParaRPr lang="en-US"/>
           </a:p>
@@ -2451,7 +2451,7 @@
           <a:p>
             <a:fld id="{A3639A2A-823D-48B7-9ACE-7FAF42870BA9}" type="datetime1">
               <a:rPr lang="en-US" smtClean="0"/>
-              <a:t>10/31/2015</a:t>
+              <a:t>11/3/2015</a:t>
             </a:fld>
             <a:endParaRPr lang="en-US"/>
           </a:p>
@@ -2631,7 +2631,7 @@
           <a:p>
             <a:fld id="{ED1B6996-82E9-463C-972C-7B56056E426C}" type="datetime1">
               <a:rPr lang="en-US" smtClean="0"/>
-              <a:t>10/31/2015</a:t>
+              <a:t>11/3/2015</a:t>
             </a:fld>
             <a:endParaRPr lang="en-US"/>
           </a:p>
@@ -2807,7 +2807,7 @@
           <a:p>
             <a:fld id="{E22ED4DA-448D-4BB1-B935-CC112220207B}" type="datetime1">
               <a:rPr lang="en-US" smtClean="0"/>
-              <a:t>10/31/2015</a:t>
+              <a:t>11/3/2015</a:t>
             </a:fld>
             <a:endParaRPr lang="en-US"/>
           </a:p>
@@ -2989,7 +2989,7 @@
           <a:p>
             <a:fld id="{E22ED4DA-448D-4BB1-B935-CC112220207B}" type="datetime1">
               <a:rPr lang="en-US" smtClean="0"/>
-              <a:t>10/31/2015</a:t>
+              <a:t>11/3/2015</a:t>
             </a:fld>
             <a:endParaRPr lang="en-US"/>
           </a:p>
@@ -3258,7 +3258,7 @@
           <a:p>
             <a:fld id="{FF5D65A6-AB94-4435-B0B7-3743215FA46C}" type="datetime1">
               <a:rPr lang="en-US" smtClean="0"/>
-              <a:t>10/31/2015</a:t>
+              <a:t>11/3/2015</a:t>
             </a:fld>
             <a:endParaRPr lang="en-US"/>
           </a:p>
@@ -3561,7 +3561,7 @@
           <a:p>
             <a:fld id="{5D1846AD-9252-4647-9435-4C2AC365653A}" type="datetime1">
               <a:rPr lang="en-US" smtClean="0"/>
-              <a:t>10/31/2015</a:t>
+              <a:t>11/3/2015</a:t>
             </a:fld>
             <a:endParaRPr lang="en-US"/>
           </a:p>
@@ -3739,7 +3739,7 @@
           <a:p>
             <a:fld id="{FF5D65A6-AB94-4435-B0B7-3743215FA46C}" type="datetime1">
               <a:rPr lang="en-US" smtClean="0"/>
-              <a:t>10/31/2015</a:t>
+              <a:t>11/3/2015</a:t>
             </a:fld>
             <a:endParaRPr lang="en-US"/>
           </a:p>
@@ -4041,7 +4041,7 @@
           <a:p>
             <a:fld id="{7C193DC4-6EF0-48C9-B29C-616106A645E1}" type="datetime1">
               <a:rPr lang="en-US" smtClean="0"/>
-              <a:t>10/31/2015</a:t>
+              <a:t>11/3/2015</a:t>
             </a:fld>
             <a:endParaRPr lang="en-US"/>
           </a:p>
@@ -4329,7 +4329,7 @@
           <a:p>
             <a:fld id="{5D1846AD-9252-4647-9435-4C2AC365653A}" type="datetime1">
               <a:rPr lang="en-US" smtClean="0"/>
-              <a:t>10/31/2015</a:t>
+              <a:t>11/3/2015</a:t>
             </a:fld>
             <a:endParaRPr lang="en-US"/>
           </a:p>
@@ -4751,7 +4751,7 @@
           <a:p>
             <a:fld id="{CE56DC10-3561-4063-A6AF-C1CC7A41040A}" type="datetime1">
               <a:rPr lang="en-US" smtClean="0"/>
-              <a:t>10/31/2015</a:t>
+              <a:t>11/3/2015</a:t>
             </a:fld>
             <a:endParaRPr lang="en-US"/>
           </a:p>
@@ -4976,7 +4976,7 @@
           <a:p>
             <a:fld id="{02B3F677-983B-48DB-ADFD-63FE6CBC7FB2}" type="datetime1">
               <a:rPr lang="en-US" smtClean="0"/>
-              <a:t>10/31/2015</a:t>
+              <a:t>11/3/2015</a:t>
             </a:fld>
             <a:endParaRPr lang="en-US"/>
           </a:p>
@@ -5535,7 +5535,6 @@
                 <a:rPr lang="en-US" sz="1000" dirty="0" smtClean="0"/>
                 <a:t>2012-2015</a:t>
               </a:r>
-              <a:endParaRPr lang="en-US" sz="1000" dirty="0" smtClean="0"/>
             </a:p>
             <a:p>
               <a:r>
@@ -12646,15 +12645,7 @@
                   <a:schemeClr val="tx1"/>
                 </a:solidFill>
               </a:rPr>
-              <a:t> are the field names.  We’ve put in their contracts as a comment</a:t>
-            </a:r>
-            <a:r>
-              <a:rPr lang="en-US" dirty="0" smtClean="0">
-                <a:solidFill>
-                  <a:schemeClr val="tx1"/>
-                </a:solidFill>
-              </a:rPr>
-              <a:t>. In a real example, you’d put an interpretation for each field, just  as  you do the fields  of a </a:t>
+              <a:t> are the field names.  We’ve put in their contracts as a comment. In a real example, you’d put an interpretation for each field, just  as  you do the fields  of a </a:t>
             </a:r>
             <a:r>
               <a:rPr lang="en-US" b="1" dirty="0" err="1" smtClean="0">

</xml_diff>

<commit_message>
starting to work on Module 09
</commit_message>
<xml_diff>
--- a/Slides/Lesson 9.1 Classes, Objects, and Methods.pptx
+++ b/Slides/Lesson 9.1 Classes, Objects, and Methods.pptx
@@ -235,7 +235,7 @@
           <a:p>
             <a:fld id="{36D53524-F9CC-4A8B-8CCD-2FA372311425}" type="datetimeFigureOut">
               <a:rPr lang="en-US" smtClean="0"/>
-              <a:t>10/29/2016</a:t>
+              <a:t>11/1/2016</a:t>
             </a:fld>
             <a:endParaRPr lang="en-US"/>
           </a:p>
@@ -1521,7 +1521,7 @@
           <a:p>
             <a:fld id="{2F1F79F5-7BEC-496A-AFC7-876E38F64D71}" type="datetime1">
               <a:rPr lang="en-US" smtClean="0"/>
-              <a:t>10/29/2016</a:t>
+              <a:t>11/1/2016</a:t>
             </a:fld>
             <a:endParaRPr lang="en-US"/>
           </a:p>
@@ -1638,7 +1638,7 @@
           <a:p>
             <a:fld id="{2F7B77F5-1464-4F6B-92A8-64FC8A508293}" type="datetime1">
               <a:rPr lang="en-US" smtClean="0"/>
-              <a:t>10/29/2016</a:t>
+              <a:t>11/1/2016</a:t>
             </a:fld>
             <a:endParaRPr lang="en-US"/>
           </a:p>
@@ -1733,7 +1733,7 @@
           <a:p>
             <a:fld id="{0A05703A-7669-4FEA-9056-25299B4D29D4}" type="datetime1">
               <a:rPr lang="en-US" smtClean="0"/>
-              <a:t>10/29/2016</a:t>
+              <a:t>11/1/2016</a:t>
             </a:fld>
             <a:endParaRPr lang="en-US"/>
           </a:p>
@@ -2008,7 +2008,7 @@
           <a:p>
             <a:fld id="{6E5077B5-BB57-49DB-88CA-226A139E5C01}" type="datetime1">
               <a:rPr lang="en-US" smtClean="0"/>
-              <a:t>10/29/2016</a:t>
+              <a:t>11/1/2016</a:t>
             </a:fld>
             <a:endParaRPr lang="en-US"/>
           </a:p>
@@ -2260,7 +2260,7 @@
           <a:p>
             <a:fld id="{C48D9447-CBD6-49A1-89FD-8512A8CF8999}" type="datetime1">
               <a:rPr lang="en-US" smtClean="0"/>
-              <a:t>10/29/2016</a:t>
+              <a:t>11/1/2016</a:t>
             </a:fld>
             <a:endParaRPr lang="en-US"/>
           </a:p>
@@ -2428,7 +2428,7 @@
           <a:p>
             <a:fld id="{A3639A2A-823D-48B7-9ACE-7FAF42870BA9}" type="datetime1">
               <a:rPr lang="en-US" smtClean="0"/>
-              <a:t>10/29/2016</a:t>
+              <a:t>11/1/2016</a:t>
             </a:fld>
             <a:endParaRPr lang="en-US"/>
           </a:p>
@@ -2606,7 +2606,7 @@
           <a:p>
             <a:fld id="{ED1B6996-82E9-463C-972C-7B56056E426C}" type="datetime1">
               <a:rPr lang="en-US" smtClean="0"/>
-              <a:t>10/29/2016</a:t>
+              <a:t>11/1/2016</a:t>
             </a:fld>
             <a:endParaRPr lang="en-US"/>
           </a:p>
@@ -2780,7 +2780,7 @@
           <a:p>
             <a:fld id="{E22ED4DA-448D-4BB1-B935-CC112220207B}" type="datetime1">
               <a:rPr lang="en-US" smtClean="0"/>
-              <a:t>10/29/2016</a:t>
+              <a:t>11/1/2016</a:t>
             </a:fld>
             <a:endParaRPr lang="en-US"/>
           </a:p>
@@ -2953,7 +2953,7 @@
           <a:p>
             <a:fld id="{E22ED4DA-448D-4BB1-B935-CC112220207B}" type="datetime1">
               <a:rPr lang="en-US" smtClean="0"/>
-              <a:t>10/29/2016</a:t>
+              <a:t>11/1/2016</a:t>
             </a:fld>
             <a:endParaRPr lang="en-US"/>
           </a:p>
@@ -3213,7 +3213,7 @@
           <a:p>
             <a:fld id="{FF5D65A6-AB94-4435-B0B7-3743215FA46C}" type="datetime1">
               <a:rPr lang="en-US" smtClean="0"/>
-              <a:t>10/29/2016</a:t>
+              <a:t>11/1/2016</a:t>
             </a:fld>
             <a:endParaRPr lang="en-US"/>
           </a:p>
@@ -3506,7 +3506,7 @@
           <a:p>
             <a:fld id="{5D1846AD-9252-4647-9435-4C2AC365653A}" type="datetime1">
               <a:rPr lang="en-US" smtClean="0"/>
-              <a:t>10/29/2016</a:t>
+              <a:t>11/1/2016</a:t>
             </a:fld>
             <a:endParaRPr lang="en-US"/>
           </a:p>
@@ -3682,7 +3682,7 @@
           <a:p>
             <a:fld id="{FF5D65A6-AB94-4435-B0B7-3743215FA46C}" type="datetime1">
               <a:rPr lang="en-US" smtClean="0"/>
-              <a:t>10/29/2016</a:t>
+              <a:t>11/1/2016</a:t>
             </a:fld>
             <a:endParaRPr lang="en-US"/>
           </a:p>
@@ -3976,7 +3976,7 @@
           <a:p>
             <a:fld id="{7C193DC4-6EF0-48C9-B29C-616106A645E1}" type="datetime1">
               <a:rPr lang="en-US" smtClean="0"/>
-              <a:t>10/29/2016</a:t>
+              <a:t>11/1/2016</a:t>
             </a:fld>
             <a:endParaRPr lang="en-US"/>
           </a:p>
@@ -4261,7 +4261,7 @@
           <a:p>
             <a:fld id="{5D1846AD-9252-4647-9435-4C2AC365653A}" type="datetime1">
               <a:rPr lang="en-US" smtClean="0"/>
-              <a:t>10/29/2016</a:t>
+              <a:t>11/1/2016</a:t>
             </a:fld>
             <a:endParaRPr lang="en-US"/>
           </a:p>
@@ -4680,7 +4680,7 @@
           <a:p>
             <a:fld id="{CE56DC10-3561-4063-A6AF-C1CC7A41040A}" type="datetime1">
               <a:rPr lang="en-US" smtClean="0"/>
-              <a:t>10/29/2016</a:t>
+              <a:t>11/1/2016</a:t>
             </a:fld>
             <a:endParaRPr lang="en-US"/>
           </a:p>
@@ -4903,7 +4903,7 @@
           <a:p>
             <a:fld id="{02B3F677-983B-48DB-ADFD-63FE6CBC7FB2}" type="datetime1">
               <a:rPr lang="en-US" smtClean="0"/>
-              <a:t>10/29/2016</a:t>
+              <a:t>11/1/2016</a:t>
             </a:fld>
             <a:endParaRPr lang="en-US"/>
           </a:p>
@@ -11513,8 +11513,8 @@
         </p:nvSpPr>
         <p:spPr>
           <a:xfrm>
-            <a:off x="2236573" y="6111564"/>
-            <a:ext cx="5906529" cy="442601"/>
+            <a:off x="2236574" y="6111564"/>
+            <a:ext cx="4668080" cy="658844"/>
           </a:xfrm>
           <a:prstGeom prst="rect">
             <a:avLst/>
@@ -11567,7 +11567,7 @@
                   <a:schemeClr val="tx1"/>
                 </a:solidFill>
               </a:rPr>
-              <a:t> is a function of no arguments (legal in #</a:t>
+              <a:t> will be the name of a method that takes no arguments (legal in #</a:t>
             </a:r>
             <a:r>
               <a:rPr lang="en-US" dirty="0" err="1">
@@ -13160,7 +13160,23 @@
                   <a:schemeClr val="tx1"/>
                 </a:solidFill>
               </a:rPr>
-              <a:t>Here’s the definition of Class2% .  Observe that it has different field names, but the same method names.  The method definitions refer to the new field names.</a:t>
+              <a:t>Here’s the definition of </a:t>
+            </a:r>
+            <a:r>
+              <a:rPr lang="en-US" b="1" dirty="0">
+                <a:solidFill>
+                  <a:schemeClr val="tx1"/>
+                </a:solidFill>
+              </a:rPr>
+              <a:t>Class2% </a:t>
+            </a:r>
+            <a:r>
+              <a:rPr lang="en-US" dirty="0">
+                <a:solidFill>
+                  <a:schemeClr val="tx1"/>
+                </a:solidFill>
+              </a:rPr>
+              <a:t>.  Observe that it has different field names, but the same method names.  The method definitions refer to the new field names.</a:t>
             </a:r>
           </a:p>
         </p:txBody>

</xml_diff>